<commit_message>
chore(test): edit chart title template
</commit_message>
<xml_diff>
--- a/__tests__/pptx-templates/ChartBarsStacked.pptx
+++ b/__tests__/pptx-templates/ChartBarsStacked.pptx
@@ -127,6 +127,31 @@
   </mc:AlternateContent>
   <c:chart>
     <c:title>
+      <c:tx>
+        <c:rich>
+          <a:bodyPr rot="0" spcFirstLastPara="1" vertOverflow="ellipsis" vert="horz" wrap="square" anchor="ctr" anchorCtr="1"/>
+          <a:lstStyle/>
+          <a:p>
+            <a:pPr>
+              <a:defRPr sz="1862" b="0" i="0" u="none" strike="noStrike" kern="1200" spc="0" baseline="0">
+                <a:solidFill>
+                  <a:schemeClr val="tx1">
+                    <a:lumMod val="65000"/>
+                    <a:lumOff val="35000"/>
+                  </a:schemeClr>
+                </a:solidFill>
+                <a:latin typeface="+mn-lt"/>
+                <a:ea typeface="+mn-ea"/>
+                <a:cs typeface="+mn-cs"/>
+              </a:defRPr>
+            </a:pPr>
+            <a:r>
+              <a:rPr lang="en-US"/>
+              <a:t>Title</a:t>
+            </a:r>
+          </a:p>
+        </c:rich>
+      </c:tx>
       <c:overlay val="0"/>
       <c:spPr>
         <a:noFill/>
@@ -1252,7 +1277,7 @@
           <a:p>
             <a:fld id="{8FB60A0F-5ED1-45ED-A5D5-DB038E6B70D9}" type="datetimeFigureOut">
               <a:rPr lang="de-DE" smtClean="0"/>
-              <a:t>25.03.2021</a:t>
+              <a:t>24.04.2024</a:t>
             </a:fld>
             <a:endParaRPr lang="de-DE"/>
           </a:p>
@@ -1450,7 +1475,7 @@
           <a:p>
             <a:fld id="{8FB60A0F-5ED1-45ED-A5D5-DB038E6B70D9}" type="datetimeFigureOut">
               <a:rPr lang="de-DE" smtClean="0"/>
-              <a:t>25.03.2021</a:t>
+              <a:t>24.04.2024</a:t>
             </a:fld>
             <a:endParaRPr lang="de-DE"/>
           </a:p>
@@ -1658,7 +1683,7 @@
           <a:p>
             <a:fld id="{8FB60A0F-5ED1-45ED-A5D5-DB038E6B70D9}" type="datetimeFigureOut">
               <a:rPr lang="de-DE" smtClean="0"/>
-              <a:t>25.03.2021</a:t>
+              <a:t>24.04.2024</a:t>
             </a:fld>
             <a:endParaRPr lang="de-DE"/>
           </a:p>
@@ -1856,7 +1881,7 @@
           <a:p>
             <a:fld id="{8FB60A0F-5ED1-45ED-A5D5-DB038E6B70D9}" type="datetimeFigureOut">
               <a:rPr lang="de-DE" smtClean="0"/>
-              <a:t>25.03.2021</a:t>
+              <a:t>24.04.2024</a:t>
             </a:fld>
             <a:endParaRPr lang="de-DE"/>
           </a:p>
@@ -2131,7 +2156,7 @@
           <a:p>
             <a:fld id="{8FB60A0F-5ED1-45ED-A5D5-DB038E6B70D9}" type="datetimeFigureOut">
               <a:rPr lang="de-DE" smtClean="0"/>
-              <a:t>25.03.2021</a:t>
+              <a:t>24.04.2024</a:t>
             </a:fld>
             <a:endParaRPr lang="de-DE"/>
           </a:p>
@@ -2396,7 +2421,7 @@
           <a:p>
             <a:fld id="{8FB60A0F-5ED1-45ED-A5D5-DB038E6B70D9}" type="datetimeFigureOut">
               <a:rPr lang="de-DE" smtClean="0"/>
-              <a:t>25.03.2021</a:t>
+              <a:t>24.04.2024</a:t>
             </a:fld>
             <a:endParaRPr lang="de-DE"/>
           </a:p>
@@ -2808,7 +2833,7 @@
           <a:p>
             <a:fld id="{8FB60A0F-5ED1-45ED-A5D5-DB038E6B70D9}" type="datetimeFigureOut">
               <a:rPr lang="de-DE" smtClean="0"/>
-              <a:t>25.03.2021</a:t>
+              <a:t>24.04.2024</a:t>
             </a:fld>
             <a:endParaRPr lang="de-DE"/>
           </a:p>
@@ -2949,7 +2974,7 @@
           <a:p>
             <a:fld id="{8FB60A0F-5ED1-45ED-A5D5-DB038E6B70D9}" type="datetimeFigureOut">
               <a:rPr lang="de-DE" smtClean="0"/>
-              <a:t>25.03.2021</a:t>
+              <a:t>24.04.2024</a:t>
             </a:fld>
             <a:endParaRPr lang="de-DE"/>
           </a:p>
@@ -3062,7 +3087,7 @@
           <a:p>
             <a:fld id="{8FB60A0F-5ED1-45ED-A5D5-DB038E6B70D9}" type="datetimeFigureOut">
               <a:rPr lang="de-DE" smtClean="0"/>
-              <a:t>25.03.2021</a:t>
+              <a:t>24.04.2024</a:t>
             </a:fld>
             <a:endParaRPr lang="de-DE"/>
           </a:p>
@@ -3373,7 +3398,7 @@
           <a:p>
             <a:fld id="{8FB60A0F-5ED1-45ED-A5D5-DB038E6B70D9}" type="datetimeFigureOut">
               <a:rPr lang="de-DE" smtClean="0"/>
-              <a:t>25.03.2021</a:t>
+              <a:t>24.04.2024</a:t>
             </a:fld>
             <a:endParaRPr lang="de-DE"/>
           </a:p>
@@ -3661,7 +3686,7 @@
           <a:p>
             <a:fld id="{8FB60A0F-5ED1-45ED-A5D5-DB038E6B70D9}" type="datetimeFigureOut">
               <a:rPr lang="de-DE" smtClean="0"/>
-              <a:t>25.03.2021</a:t>
+              <a:t>24.04.2024</a:t>
             </a:fld>
             <a:endParaRPr lang="de-DE"/>
           </a:p>
@@ -3902,7 +3927,7 @@
           <a:p>
             <a:fld id="{8FB60A0F-5ED1-45ED-A5D5-DB038E6B70D9}" type="datetimeFigureOut">
               <a:rPr lang="de-DE" smtClean="0"/>
-              <a:t>25.03.2021</a:t>
+              <a:t>24.04.2024</a:t>
             </a:fld>
             <a:endParaRPr lang="de-DE"/>
           </a:p>
@@ -4332,7 +4357,7 @@
           <p:nvPr>
             <p:extLst>
               <p:ext uri="{D42A27DB-BD31-4B8C-83A1-F6EECF244321}">
-                <p14:modId xmlns:p14="http://schemas.microsoft.com/office/powerpoint/2010/main" val="4173434270"/>
+                <p14:modId xmlns:p14="http://schemas.microsoft.com/office/powerpoint/2010/main" val="1458010103"/>
               </p:ext>
             </p:extLst>
           </p:nvPr>

</xml_diff>